<commit_message>
Route the buttons on the home page
</commit_message>
<xml_diff>
--- a/Group8_Presentation.pptx
+++ b/Group8_Presentation.pptx
@@ -3902,253 +3902,274 @@
           </a:prstGeom>
         </p:spPr>
       </p:pic>
-      <p:sp>
-        <p:nvSpPr>
-          <p:cNvPr id="11" name="TextBox 10">
-            <a:extLst>
-              <a:ext uri="{FF2B5EF4-FFF2-40B4-BE49-F238E27FC236}">
-                <a16:creationId xmlns:a16="http://schemas.microsoft.com/office/drawing/2014/main" id="{BDE9E61F-EEDC-B5A6-CA69-F5E5B2580A46}"/>
-              </a:ext>
-            </a:extLst>
-          </p:cNvPr>
-          <p:cNvSpPr txBox="1"/>
+      <p:grpSp>
+        <p:nvGrpSpPr>
+          <p:cNvPr id="52" name="Group 51">
+            <a:extLst>
+              <a:ext uri="{FF2B5EF4-FFF2-40B4-BE49-F238E27FC236}">
+                <a16:creationId xmlns:a16="http://schemas.microsoft.com/office/drawing/2014/main" id="{E8D8A8CB-7DDF-EE6D-7FB3-3072373F71F2}"/>
+              </a:ext>
+            </a:extLst>
+          </p:cNvPr>
+          <p:cNvGrpSpPr/>
           <p:nvPr/>
-        </p:nvSpPr>
-        <p:spPr>
+        </p:nvGrpSpPr>
+        <p:grpSpPr>
           <a:xfrm>
-            <a:off x="6094301" y="2413969"/>
-            <a:ext cx="3377946" cy="1200329"/>
+            <a:off x="4526458" y="1852863"/>
+            <a:ext cx="5555580" cy="2598104"/>
+            <a:chOff x="5472204" y="2413969"/>
+            <a:chExt cx="4609834" cy="2036998"/>
           </a:xfrm>
-          <a:prstGeom prst="rect">
-            <a:avLst/>
-          </a:prstGeom>
-          <a:noFill/>
-        </p:spPr>
-        <p:txBody>
-          <a:bodyPr wrap="square" rtlCol="0">
-            <a:spAutoFit/>
-          </a:bodyPr>
-          <a:lstStyle/>
-          <a:p>
-            <a:r>
-              <a:rPr lang="fr-FR" sz="7200" dirty="0"/>
-              <a:t>The Hub</a:t>
-            </a:r>
-          </a:p>
-        </p:txBody>
-      </p:sp>
-      <p:sp>
-        <p:nvSpPr>
-          <p:cNvPr id="13" name="Left Bracket 12">
-            <a:extLst>
-              <a:ext uri="{FF2B5EF4-FFF2-40B4-BE49-F238E27FC236}">
-                <a16:creationId xmlns:a16="http://schemas.microsoft.com/office/drawing/2014/main" id="{AF52E8F8-162F-6FB7-0CD8-6142033BD000}"/>
-              </a:ext>
-            </a:extLst>
-          </p:cNvPr>
-          <p:cNvSpPr/>
-          <p:nvPr/>
-        </p:nvSpPr>
-        <p:spPr>
-          <a:xfrm rot="16200000">
-            <a:off x="7562552" y="1710755"/>
-            <a:ext cx="429139" cy="3377943"/>
-          </a:xfrm>
-          <a:prstGeom prst="leftBracket">
-            <a:avLst>
-              <a:gd name="adj" fmla="val 0"/>
-            </a:avLst>
-          </a:prstGeom>
-          <a:ln w="114300">
-            <a:solidFill>
-              <a:srgbClr val="FFFF66"/>
-            </a:solidFill>
-          </a:ln>
-        </p:spPr>
-        <p:style>
-          <a:lnRef idx="1">
-            <a:schemeClr val="accent1"/>
-          </a:lnRef>
-          <a:fillRef idx="0">
-            <a:schemeClr val="accent1"/>
-          </a:fillRef>
-          <a:effectRef idx="0">
-            <a:schemeClr val="accent1"/>
-          </a:effectRef>
-          <a:fontRef idx="minor">
-            <a:schemeClr val="tx1"/>
-          </a:fontRef>
-        </p:style>
-        <p:txBody>
-          <a:bodyPr rtlCol="0" anchor="ctr"/>
-          <a:lstStyle/>
-          <a:p>
-            <a:pPr algn="ctr"/>
-            <a:endParaRPr lang="fr-FR">
-              <a:noFill/>
-            </a:endParaRPr>
-          </a:p>
-        </p:txBody>
-      </p:sp>
-      <p:sp>
-        <p:nvSpPr>
-          <p:cNvPr id="15" name="Left Bracket 14">
-            <a:extLst>
-              <a:ext uri="{FF2B5EF4-FFF2-40B4-BE49-F238E27FC236}">
-                <a16:creationId xmlns:a16="http://schemas.microsoft.com/office/drawing/2014/main" id="{7A2538D3-775C-D9ED-D72B-52E04116D1C7}"/>
-              </a:ext>
-            </a:extLst>
-          </p:cNvPr>
-          <p:cNvSpPr/>
-          <p:nvPr/>
-        </p:nvSpPr>
-        <p:spPr>
-          <a:xfrm rot="16200000">
-            <a:off x="7273000" y="1507728"/>
-            <a:ext cx="971632" cy="3748161"/>
-          </a:xfrm>
-          <a:prstGeom prst="leftBracket">
-            <a:avLst>
-              <a:gd name="adj" fmla="val 0"/>
-            </a:avLst>
-          </a:prstGeom>
-          <a:ln w="114300">
-            <a:solidFill>
-              <a:srgbClr val="A7D971"/>
-            </a:solidFill>
-          </a:ln>
-        </p:spPr>
-        <p:style>
-          <a:lnRef idx="1">
-            <a:schemeClr val="accent1"/>
-          </a:lnRef>
-          <a:fillRef idx="0">
-            <a:schemeClr val="accent1"/>
-          </a:fillRef>
-          <a:effectRef idx="0">
-            <a:schemeClr val="accent1"/>
-          </a:effectRef>
-          <a:fontRef idx="minor">
-            <a:schemeClr val="tx1"/>
-          </a:fontRef>
-        </p:style>
-        <p:txBody>
-          <a:bodyPr rtlCol="0" anchor="ctr"/>
-          <a:lstStyle/>
-          <a:p>
-            <a:pPr algn="ctr"/>
-            <a:endParaRPr lang="fr-FR">
-              <a:noFill/>
-            </a:endParaRPr>
-          </a:p>
-        </p:txBody>
-      </p:sp>
-      <p:sp>
-        <p:nvSpPr>
-          <p:cNvPr id="17" name="Left Bracket 16">
-            <a:extLst>
-              <a:ext uri="{FF2B5EF4-FFF2-40B4-BE49-F238E27FC236}">
-                <a16:creationId xmlns:a16="http://schemas.microsoft.com/office/drawing/2014/main" id="{5310D8A1-ABFA-B8E2-1991-2BAA65CAF02F}"/>
-              </a:ext>
-            </a:extLst>
-          </p:cNvPr>
-          <p:cNvSpPr/>
-          <p:nvPr/>
-        </p:nvSpPr>
-        <p:spPr>
-          <a:xfrm rot="16200000">
-            <a:off x="7291306" y="1573335"/>
-            <a:ext cx="971629" cy="4195276"/>
-          </a:xfrm>
-          <a:prstGeom prst="leftBracket">
-            <a:avLst>
-              <a:gd name="adj" fmla="val 0"/>
-            </a:avLst>
-          </a:prstGeom>
-          <a:ln w="114300">
-            <a:solidFill>
-              <a:srgbClr val="FF4F4F"/>
-            </a:solidFill>
-          </a:ln>
-        </p:spPr>
-        <p:style>
-          <a:lnRef idx="1">
-            <a:schemeClr val="accent1"/>
-          </a:lnRef>
-          <a:fillRef idx="0">
-            <a:schemeClr val="accent1"/>
-          </a:fillRef>
-          <a:effectRef idx="0">
-            <a:schemeClr val="accent1"/>
-          </a:effectRef>
-          <a:fontRef idx="minor">
-            <a:schemeClr val="tx1"/>
-          </a:fontRef>
-        </p:style>
-        <p:txBody>
-          <a:bodyPr rtlCol="0" anchor="ctr"/>
-          <a:lstStyle/>
-          <a:p>
-            <a:pPr algn="ctr"/>
-            <a:endParaRPr lang="fr-FR">
-              <a:noFill/>
-            </a:endParaRPr>
-          </a:p>
-        </p:txBody>
-      </p:sp>
-      <p:sp>
-        <p:nvSpPr>
-          <p:cNvPr id="18" name="Left Bracket 17">
-            <a:extLst>
-              <a:ext uri="{FF2B5EF4-FFF2-40B4-BE49-F238E27FC236}">
-                <a16:creationId xmlns:a16="http://schemas.microsoft.com/office/drawing/2014/main" id="{99CDB151-E283-B3FF-1477-1B3500E0AA26}"/>
-              </a:ext>
-            </a:extLst>
-          </p:cNvPr>
-          <p:cNvSpPr/>
-          <p:nvPr/>
-        </p:nvSpPr>
-        <p:spPr>
-          <a:xfrm rot="16200000">
-            <a:off x="7068015" y="1436945"/>
-            <a:ext cx="1418211" cy="4609834"/>
-          </a:xfrm>
-          <a:prstGeom prst="leftBracket">
-            <a:avLst>
-              <a:gd name="adj" fmla="val 0"/>
-            </a:avLst>
-          </a:prstGeom>
-          <a:ln w="114300">
-            <a:solidFill>
-              <a:srgbClr val="57D3FF"/>
-            </a:solidFill>
-          </a:ln>
-        </p:spPr>
-        <p:style>
-          <a:lnRef idx="1">
-            <a:schemeClr val="accent1"/>
-          </a:lnRef>
-          <a:fillRef idx="0">
-            <a:schemeClr val="accent1"/>
-          </a:fillRef>
-          <a:effectRef idx="0">
-            <a:schemeClr val="accent1"/>
-          </a:effectRef>
-          <a:fontRef idx="minor">
-            <a:schemeClr val="tx1"/>
-          </a:fontRef>
-        </p:style>
-        <p:txBody>
-          <a:bodyPr rtlCol="0" anchor="ctr"/>
-          <a:lstStyle/>
-          <a:p>
-            <a:pPr algn="ctr"/>
-            <a:endParaRPr lang="fr-FR">
-              <a:noFill/>
-            </a:endParaRPr>
-          </a:p>
-        </p:txBody>
-      </p:sp>
+        </p:grpSpPr>
+        <p:sp>
+          <p:nvSpPr>
+            <p:cNvPr id="11" name="TextBox 10">
+              <a:extLst>
+                <a:ext uri="{FF2B5EF4-FFF2-40B4-BE49-F238E27FC236}">
+                  <a16:creationId xmlns:a16="http://schemas.microsoft.com/office/drawing/2014/main" id="{BDE9E61F-EEDC-B5A6-CA69-F5E5B2580A46}"/>
+                </a:ext>
+              </a:extLst>
+            </p:cNvPr>
+            <p:cNvSpPr txBox="1"/>
+            <p:nvPr/>
+          </p:nvSpPr>
+          <p:spPr>
+            <a:xfrm>
+              <a:off x="6094301" y="2413969"/>
+              <a:ext cx="3377946" cy="1200329"/>
+            </a:xfrm>
+            <a:prstGeom prst="rect">
+              <a:avLst/>
+            </a:prstGeom>
+            <a:noFill/>
+          </p:spPr>
+          <p:txBody>
+            <a:bodyPr wrap="square" rtlCol="0">
+              <a:spAutoFit/>
+            </a:bodyPr>
+            <a:lstStyle/>
+            <a:p>
+              <a:r>
+                <a:rPr lang="fr-FR" sz="7200" dirty="0"/>
+                <a:t>The Hub</a:t>
+              </a:r>
+            </a:p>
+          </p:txBody>
+        </p:sp>
+        <p:sp>
+          <p:nvSpPr>
+            <p:cNvPr id="13" name="Left Bracket 12">
+              <a:extLst>
+                <a:ext uri="{FF2B5EF4-FFF2-40B4-BE49-F238E27FC236}">
+                  <a16:creationId xmlns:a16="http://schemas.microsoft.com/office/drawing/2014/main" id="{AF52E8F8-162F-6FB7-0CD8-6142033BD000}"/>
+                </a:ext>
+              </a:extLst>
+            </p:cNvPr>
+            <p:cNvSpPr/>
+            <p:nvPr/>
+          </p:nvSpPr>
+          <p:spPr>
+            <a:xfrm rot="16200000">
+              <a:off x="7562552" y="1710755"/>
+              <a:ext cx="429139" cy="3377943"/>
+            </a:xfrm>
+            <a:prstGeom prst="leftBracket">
+              <a:avLst>
+                <a:gd name="adj" fmla="val 0"/>
+              </a:avLst>
+            </a:prstGeom>
+            <a:ln w="114300">
+              <a:solidFill>
+                <a:srgbClr val="FFFF66"/>
+              </a:solidFill>
+            </a:ln>
+          </p:spPr>
+          <p:style>
+            <a:lnRef idx="1">
+              <a:schemeClr val="accent1"/>
+            </a:lnRef>
+            <a:fillRef idx="0">
+              <a:schemeClr val="accent1"/>
+            </a:fillRef>
+            <a:effectRef idx="0">
+              <a:schemeClr val="accent1"/>
+            </a:effectRef>
+            <a:fontRef idx="minor">
+              <a:schemeClr val="tx1"/>
+            </a:fontRef>
+          </p:style>
+          <p:txBody>
+            <a:bodyPr rtlCol="0" anchor="ctr"/>
+            <a:lstStyle/>
+            <a:p>
+              <a:pPr algn="ctr"/>
+              <a:endParaRPr lang="fr-FR">
+                <a:noFill/>
+              </a:endParaRPr>
+            </a:p>
+          </p:txBody>
+        </p:sp>
+        <p:sp>
+          <p:nvSpPr>
+            <p:cNvPr id="15" name="Left Bracket 14">
+              <a:extLst>
+                <a:ext uri="{FF2B5EF4-FFF2-40B4-BE49-F238E27FC236}">
+                  <a16:creationId xmlns:a16="http://schemas.microsoft.com/office/drawing/2014/main" id="{7A2538D3-775C-D9ED-D72B-52E04116D1C7}"/>
+                </a:ext>
+              </a:extLst>
+            </p:cNvPr>
+            <p:cNvSpPr/>
+            <p:nvPr/>
+          </p:nvSpPr>
+          <p:spPr>
+            <a:xfrm rot="16200000">
+              <a:off x="7273000" y="1507728"/>
+              <a:ext cx="971632" cy="3748161"/>
+            </a:xfrm>
+            <a:prstGeom prst="leftBracket">
+              <a:avLst>
+                <a:gd name="adj" fmla="val 0"/>
+              </a:avLst>
+            </a:prstGeom>
+            <a:ln w="114300">
+              <a:solidFill>
+                <a:srgbClr val="A7D971"/>
+              </a:solidFill>
+            </a:ln>
+          </p:spPr>
+          <p:style>
+            <a:lnRef idx="1">
+              <a:schemeClr val="accent1"/>
+            </a:lnRef>
+            <a:fillRef idx="0">
+              <a:schemeClr val="accent1"/>
+            </a:fillRef>
+            <a:effectRef idx="0">
+              <a:schemeClr val="accent1"/>
+            </a:effectRef>
+            <a:fontRef idx="minor">
+              <a:schemeClr val="tx1"/>
+            </a:fontRef>
+          </p:style>
+          <p:txBody>
+            <a:bodyPr rtlCol="0" anchor="ctr"/>
+            <a:lstStyle/>
+            <a:p>
+              <a:pPr algn="ctr"/>
+              <a:endParaRPr lang="fr-FR">
+                <a:noFill/>
+              </a:endParaRPr>
+            </a:p>
+          </p:txBody>
+        </p:sp>
+        <p:sp>
+          <p:nvSpPr>
+            <p:cNvPr id="17" name="Left Bracket 16">
+              <a:extLst>
+                <a:ext uri="{FF2B5EF4-FFF2-40B4-BE49-F238E27FC236}">
+                  <a16:creationId xmlns:a16="http://schemas.microsoft.com/office/drawing/2014/main" id="{5310D8A1-ABFA-B8E2-1991-2BAA65CAF02F}"/>
+                </a:ext>
+              </a:extLst>
+            </p:cNvPr>
+            <p:cNvSpPr/>
+            <p:nvPr/>
+          </p:nvSpPr>
+          <p:spPr>
+            <a:xfrm rot="16200000">
+              <a:off x="7291306" y="1573335"/>
+              <a:ext cx="971629" cy="4195276"/>
+            </a:xfrm>
+            <a:prstGeom prst="leftBracket">
+              <a:avLst>
+                <a:gd name="adj" fmla="val 0"/>
+              </a:avLst>
+            </a:prstGeom>
+            <a:ln w="114300">
+              <a:solidFill>
+                <a:srgbClr val="FF4F4F"/>
+              </a:solidFill>
+            </a:ln>
+          </p:spPr>
+          <p:style>
+            <a:lnRef idx="1">
+              <a:schemeClr val="accent1"/>
+            </a:lnRef>
+            <a:fillRef idx="0">
+              <a:schemeClr val="accent1"/>
+            </a:fillRef>
+            <a:effectRef idx="0">
+              <a:schemeClr val="accent1"/>
+            </a:effectRef>
+            <a:fontRef idx="minor">
+              <a:schemeClr val="tx1"/>
+            </a:fontRef>
+          </p:style>
+          <p:txBody>
+            <a:bodyPr rtlCol="0" anchor="ctr"/>
+            <a:lstStyle/>
+            <a:p>
+              <a:pPr algn="ctr"/>
+              <a:endParaRPr lang="fr-FR">
+                <a:noFill/>
+              </a:endParaRPr>
+            </a:p>
+          </p:txBody>
+        </p:sp>
+        <p:sp>
+          <p:nvSpPr>
+            <p:cNvPr id="18" name="Left Bracket 17">
+              <a:extLst>
+                <a:ext uri="{FF2B5EF4-FFF2-40B4-BE49-F238E27FC236}">
+                  <a16:creationId xmlns:a16="http://schemas.microsoft.com/office/drawing/2014/main" id="{99CDB151-E283-B3FF-1477-1B3500E0AA26}"/>
+                </a:ext>
+              </a:extLst>
+            </p:cNvPr>
+            <p:cNvSpPr/>
+            <p:nvPr/>
+          </p:nvSpPr>
+          <p:spPr>
+            <a:xfrm rot="16200000">
+              <a:off x="7068015" y="1436945"/>
+              <a:ext cx="1418211" cy="4609834"/>
+            </a:xfrm>
+            <a:prstGeom prst="leftBracket">
+              <a:avLst>
+                <a:gd name="adj" fmla="val 0"/>
+              </a:avLst>
+            </a:prstGeom>
+            <a:ln w="114300">
+              <a:solidFill>
+                <a:srgbClr val="57D3FF"/>
+              </a:solidFill>
+            </a:ln>
+          </p:spPr>
+          <p:style>
+            <a:lnRef idx="1">
+              <a:schemeClr val="accent1"/>
+            </a:lnRef>
+            <a:fillRef idx="0">
+              <a:schemeClr val="accent1"/>
+            </a:fillRef>
+            <a:effectRef idx="0">
+              <a:schemeClr val="accent1"/>
+            </a:effectRef>
+            <a:fontRef idx="minor">
+              <a:schemeClr val="tx1"/>
+            </a:fontRef>
+          </p:style>
+          <p:txBody>
+            <a:bodyPr rtlCol="0" anchor="ctr"/>
+            <a:lstStyle/>
+            <a:p>
+              <a:pPr algn="ctr"/>
+              <a:endParaRPr lang="fr-FR">
+                <a:noFill/>
+              </a:endParaRPr>
+            </a:p>
+          </p:txBody>
+        </p:sp>
+      </p:grpSp>
     </p:spTree>
     <p:extLst>
       <p:ext uri="{BB962C8B-B14F-4D97-AF65-F5344CB8AC3E}">

</xml_diff>